<commit_message>
Reorganizing. Removing lab day solution. Combined sprints 3/4 int 3. Made sprint 4 for dashboard
</commit_message>
<xml_diff>
--- a/Sprint4/EdaWorkshop_Sprint4.pptx
+++ b/Sprint4/EdaWorkshop_Sprint4.pptx
@@ -5,20 +5,12 @@
     <p:sldMasterId id="2147483648" r:id="rId1"/>
   </p:sldMasterIdLst>
   <p:sldIdLst>
-    <p:sldId id="286" r:id="rId2"/>
-    <p:sldId id="305" r:id="rId3"/>
+    <p:sldId id="292" r:id="rId2"/>
+    <p:sldId id="293" r:id="rId3"/>
     <p:sldId id="294" r:id="rId4"/>
-    <p:sldId id="295" r:id="rId5"/>
-    <p:sldId id="297" r:id="rId6"/>
+    <p:sldId id="288" r:id="rId5"/>
+    <p:sldId id="295" r:id="rId6"/>
     <p:sldId id="296" r:id="rId7"/>
-    <p:sldId id="283" r:id="rId8"/>
-    <p:sldId id="300" r:id="rId9"/>
-    <p:sldId id="298" r:id="rId10"/>
-    <p:sldId id="301" r:id="rId11"/>
-    <p:sldId id="303" r:id="rId12"/>
-    <p:sldId id="304" r:id="rId13"/>
-    <p:sldId id="299" r:id="rId14"/>
-    <p:sldId id="284" r:id="rId15"/>
   </p:sldIdLst>
   <p:sldSz cx="12192000" cy="6858000"/>
   <p:notesSz cx="6858000" cy="9144000"/>
@@ -256,7 +248,7 @@
           <a:p>
             <a:fld id="{0B5D536D-AE8C-4EAC-8CEB-B18A64A144B4}" type="datetimeFigureOut">
               <a:rPr lang="en-US" smtClean="0"/>
-              <a:t>9/27/2021</a:t>
+              <a:t>9/28/2021</a:t>
             </a:fld>
             <a:endParaRPr lang="en-US"/>
           </a:p>
@@ -426,7 +418,7 @@
           <a:p>
             <a:fld id="{0B5D536D-AE8C-4EAC-8CEB-B18A64A144B4}" type="datetimeFigureOut">
               <a:rPr lang="en-US" smtClean="0"/>
-              <a:t>9/27/2021</a:t>
+              <a:t>9/28/2021</a:t>
             </a:fld>
             <a:endParaRPr lang="en-US"/>
           </a:p>
@@ -606,7 +598,7 @@
           <a:p>
             <a:fld id="{0B5D536D-AE8C-4EAC-8CEB-B18A64A144B4}" type="datetimeFigureOut">
               <a:rPr lang="en-US" smtClean="0"/>
-              <a:t>9/27/2021</a:t>
+              <a:t>9/28/2021</a:t>
             </a:fld>
             <a:endParaRPr lang="en-US"/>
           </a:p>
@@ -776,7 +768,7 @@
           <a:p>
             <a:fld id="{0B5D536D-AE8C-4EAC-8CEB-B18A64A144B4}" type="datetimeFigureOut">
               <a:rPr lang="en-US" smtClean="0"/>
-              <a:t>9/27/2021</a:t>
+              <a:t>9/28/2021</a:t>
             </a:fld>
             <a:endParaRPr lang="en-US"/>
           </a:p>
@@ -1022,7 +1014,7 @@
           <a:p>
             <a:fld id="{0B5D536D-AE8C-4EAC-8CEB-B18A64A144B4}" type="datetimeFigureOut">
               <a:rPr lang="en-US" smtClean="0"/>
-              <a:t>9/27/2021</a:t>
+              <a:t>9/28/2021</a:t>
             </a:fld>
             <a:endParaRPr lang="en-US"/>
           </a:p>
@@ -1254,7 +1246,7 @@
           <a:p>
             <a:fld id="{0B5D536D-AE8C-4EAC-8CEB-B18A64A144B4}" type="datetimeFigureOut">
               <a:rPr lang="en-US" smtClean="0"/>
-              <a:t>9/27/2021</a:t>
+              <a:t>9/28/2021</a:t>
             </a:fld>
             <a:endParaRPr lang="en-US"/>
           </a:p>
@@ -1621,7 +1613,7 @@
           <a:p>
             <a:fld id="{0B5D536D-AE8C-4EAC-8CEB-B18A64A144B4}" type="datetimeFigureOut">
               <a:rPr lang="en-US" smtClean="0"/>
-              <a:t>9/27/2021</a:t>
+              <a:t>9/28/2021</a:t>
             </a:fld>
             <a:endParaRPr lang="en-US"/>
           </a:p>
@@ -1739,7 +1731,7 @@
           <a:p>
             <a:fld id="{0B5D536D-AE8C-4EAC-8CEB-B18A64A144B4}" type="datetimeFigureOut">
               <a:rPr lang="en-US" smtClean="0"/>
-              <a:t>9/27/2021</a:t>
+              <a:t>9/28/2021</a:t>
             </a:fld>
             <a:endParaRPr lang="en-US"/>
           </a:p>
@@ -1834,7 +1826,7 @@
           <a:p>
             <a:fld id="{0B5D536D-AE8C-4EAC-8CEB-B18A64A144B4}" type="datetimeFigureOut">
               <a:rPr lang="en-US" smtClean="0"/>
-              <a:t>9/27/2021</a:t>
+              <a:t>9/28/2021</a:t>
             </a:fld>
             <a:endParaRPr lang="en-US"/>
           </a:p>
@@ -2111,7 +2103,7 @@
           <a:p>
             <a:fld id="{0B5D536D-AE8C-4EAC-8CEB-B18A64A144B4}" type="datetimeFigureOut">
               <a:rPr lang="en-US" smtClean="0"/>
-              <a:t>9/27/2021</a:t>
+              <a:t>9/28/2021</a:t>
             </a:fld>
             <a:endParaRPr lang="en-US"/>
           </a:p>
@@ -2364,7 +2356,7 @@
           <a:p>
             <a:fld id="{0B5D536D-AE8C-4EAC-8CEB-B18A64A144B4}" type="datetimeFigureOut">
               <a:rPr lang="en-US" smtClean="0"/>
-              <a:t>9/27/2021</a:t>
+              <a:t>9/28/2021</a:t>
             </a:fld>
             <a:endParaRPr lang="en-US"/>
           </a:p>
@@ -2577,7 +2569,7 @@
           <a:p>
             <a:fld id="{0B5D536D-AE8C-4EAC-8CEB-B18A64A144B4}" type="datetimeFigureOut">
               <a:rPr lang="en-US" smtClean="0"/>
-              <a:t>9/27/2021</a:t>
+              <a:t>9/28/2021</a:t>
             </a:fld>
             <a:endParaRPr lang="en-US"/>
           </a:p>
@@ -2984,7 +2976,7 @@
       </p:grpSpPr>
       <p:sp>
         <p:nvSpPr>
-          <p:cNvPr id="4" name="Title 3"/>
+          <p:cNvPr id="2" name="Title 1"/>
           <p:cNvSpPr>
             <a:spLocks noGrp="1"/>
           </p:cNvSpPr>
@@ -2999,7 +2991,11 @@
           <a:p>
             <a:r>
               <a:rPr lang="en-US" dirty="0" smtClean="0"/>
-              <a:t>Sprint 4</a:t>
+              <a:t>Sprint </a:t>
+            </a:r>
+            <a:r>
+              <a:rPr lang="en-US" dirty="0" smtClean="0"/>
+              <a:t>4</a:t>
             </a:r>
             <a:endParaRPr lang="en-US" dirty="0"/>
           </a:p>
@@ -3007,7 +3003,7 @@
       </p:sp>
       <p:sp>
         <p:nvSpPr>
-          <p:cNvPr id="5" name="Text Placeholder 4"/>
+          <p:cNvPr id="3" name="Text Placeholder 2"/>
           <p:cNvSpPr>
             <a:spLocks noGrp="1"/>
           </p:cNvSpPr>
@@ -3022,7 +3018,7 @@
           <a:p>
             <a:r>
               <a:rPr lang="en-US" dirty="0" smtClean="0"/>
-              <a:t>UI for Manual Decisions</a:t>
+              <a:t>New Feature - Dashboard</a:t>
             </a:r>
             <a:endParaRPr lang="en-US" dirty="0"/>
           </a:p>
@@ -3031,669 +3027,7 @@
     </p:spTree>
     <p:extLst>
       <p:ext uri="{BB962C8B-B14F-4D97-AF65-F5344CB8AC3E}">
-        <p14:creationId xmlns:p14="http://schemas.microsoft.com/office/powerpoint/2010/main" val="3811699319"/>
-      </p:ext>
-    </p:extLst>
-  </p:cSld>
-  <p:clrMapOvr>
-    <a:masterClrMapping/>
-  </p:clrMapOvr>
-</p:sld>
-</file>
-
-<file path=ppt/slides/slide10.xml><?xml version="1.0" encoding="utf-8"?>
-<p:sld xmlns:a="http://schemas.openxmlformats.org/drawingml/2006/main" xmlns:r="http://schemas.openxmlformats.org/officeDocument/2006/relationships" xmlns:p="http://schemas.openxmlformats.org/presentationml/2006/main">
-  <p:cSld>
-    <p:spTree>
-      <p:nvGrpSpPr>
-        <p:cNvPr id="1" name=""/>
-        <p:cNvGrpSpPr/>
-        <p:nvPr/>
-      </p:nvGrpSpPr>
-      <p:grpSpPr>
-        <a:xfrm>
-          <a:off x="0" y="0"/>
-          <a:ext cx="0" cy="0"/>
-          <a:chOff x="0" y="0"/>
-          <a:chExt cx="0" cy="0"/>
-        </a:xfrm>
-      </p:grpSpPr>
-      <p:sp>
-        <p:nvSpPr>
-          <p:cNvPr id="2" name="Title 1"/>
-          <p:cNvSpPr>
-            <a:spLocks noGrp="1"/>
-          </p:cNvSpPr>
-          <p:nvPr>
-            <p:ph type="title"/>
-          </p:nvPr>
-        </p:nvSpPr>
-        <p:spPr/>
-        <p:txBody>
-          <a:bodyPr/>
-          <a:lstStyle/>
-          <a:p>
-            <a:r>
-              <a:rPr lang="en-US" dirty="0"/>
-              <a:t>T</a:t>
-            </a:r>
-            <a:r>
-              <a:rPr lang="en-US" dirty="0" smtClean="0"/>
-              <a:t>ask 4-2: Update UI to Get Next Request</a:t>
-            </a:r>
-            <a:endParaRPr lang="en-US" dirty="0"/>
-          </a:p>
-        </p:txBody>
-      </p:sp>
-      <p:sp>
-        <p:nvSpPr>
-          <p:cNvPr id="3" name="Content Placeholder 2"/>
-          <p:cNvSpPr>
-            <a:spLocks noGrp="1"/>
-          </p:cNvSpPr>
-          <p:nvPr>
-            <p:ph idx="1"/>
-          </p:nvPr>
-        </p:nvSpPr>
-        <p:spPr/>
-        <p:txBody>
-          <a:bodyPr/>
-          <a:lstStyle/>
-          <a:p>
-            <a:r>
-              <a:rPr lang="en-US" dirty="0" smtClean="0"/>
-              <a:t>Install </a:t>
-            </a:r>
-            <a:r>
-              <a:rPr lang="en-US" dirty="0" err="1" smtClean="0"/>
-              <a:t>Azure.Messaging.EventHubs.Producer</a:t>
-            </a:r>
-            <a:r>
-              <a:rPr lang="en-US" smtClean="0"/>
-              <a:t> </a:t>
-            </a:r>
-            <a:endParaRPr lang="en-US"/>
-          </a:p>
-          <a:p>
-            <a:endParaRPr lang="en-US" dirty="0" smtClean="0"/>
-          </a:p>
-        </p:txBody>
-      </p:sp>
-      <p:pic>
-        <p:nvPicPr>
-          <p:cNvPr id="4" name="Picture 3"/>
-          <p:cNvPicPr>
-            <a:picLocks noChangeAspect="1"/>
-          </p:cNvPicPr>
-          <p:nvPr/>
-        </p:nvPicPr>
-        <p:blipFill>
-          <a:blip r:embed="rId2" cstate="print">
-            <a:extLst>
-              <a:ext uri="{28A0092B-C50C-407E-A947-70E740481C1C}">
-                <a14:useLocalDpi xmlns:a14="http://schemas.microsoft.com/office/drawing/2010/main" val="0"/>
-              </a:ext>
-            </a:extLst>
-          </a:blip>
-          <a:stretch>
-            <a:fillRect/>
-          </a:stretch>
-        </p:blipFill>
-        <p:spPr>
-          <a:xfrm>
-            <a:off x="9135291" y="274630"/>
-            <a:ext cx="2455817" cy="1381224"/>
-          </a:xfrm>
-          <a:prstGeom prst="rect">
-            <a:avLst/>
-          </a:prstGeom>
-        </p:spPr>
-      </p:pic>
-    </p:spTree>
-    <p:extLst>
-      <p:ext uri="{BB962C8B-B14F-4D97-AF65-F5344CB8AC3E}">
-        <p14:creationId xmlns:p14="http://schemas.microsoft.com/office/powerpoint/2010/main" val="3789345674"/>
-      </p:ext>
-    </p:extLst>
-  </p:cSld>
-  <p:clrMapOvr>
-    <a:masterClrMapping/>
-  </p:clrMapOvr>
-</p:sld>
-</file>
-
-<file path=ppt/slides/slide11.xml><?xml version="1.0" encoding="utf-8"?>
-<p:sld xmlns:a="http://schemas.openxmlformats.org/drawingml/2006/main" xmlns:r="http://schemas.openxmlformats.org/officeDocument/2006/relationships" xmlns:p="http://schemas.openxmlformats.org/presentationml/2006/main">
-  <p:cSld>
-    <p:spTree>
-      <p:nvGrpSpPr>
-        <p:cNvPr id="1" name=""/>
-        <p:cNvGrpSpPr/>
-        <p:nvPr/>
-      </p:nvGrpSpPr>
-      <p:grpSpPr>
-        <a:xfrm>
-          <a:off x="0" y="0"/>
-          <a:ext cx="0" cy="0"/>
-          <a:chOff x="0" y="0"/>
-          <a:chExt cx="0" cy="0"/>
-        </a:xfrm>
-      </p:grpSpPr>
-      <p:sp>
-        <p:nvSpPr>
-          <p:cNvPr id="2" name="Title 1"/>
-          <p:cNvSpPr>
-            <a:spLocks noGrp="1"/>
-          </p:cNvSpPr>
-          <p:nvPr>
-            <p:ph type="title"/>
-          </p:nvPr>
-        </p:nvSpPr>
-        <p:spPr/>
-        <p:txBody>
-          <a:bodyPr/>
-          <a:lstStyle/>
-          <a:p>
-            <a:r>
-              <a:rPr lang="en-US" dirty="0"/>
-              <a:t>T</a:t>
-            </a:r>
-            <a:r>
-              <a:rPr lang="en-US" dirty="0" smtClean="0"/>
-              <a:t>ask 4-3: Create </a:t>
-            </a:r>
-            <a:r>
-              <a:rPr lang="en-US" i="1" dirty="0" err="1" smtClean="0"/>
-              <a:t>requestAssigned</a:t>
-            </a:r>
-            <a:r>
-              <a:rPr lang="en-US" dirty="0" smtClean="0"/>
-              <a:t> Hub</a:t>
-            </a:r>
-            <a:endParaRPr lang="en-US" dirty="0"/>
-          </a:p>
-        </p:txBody>
-      </p:sp>
-      <p:sp>
-        <p:nvSpPr>
-          <p:cNvPr id="3" name="Content Placeholder 2"/>
-          <p:cNvSpPr>
-            <a:spLocks noGrp="1"/>
-          </p:cNvSpPr>
-          <p:nvPr>
-            <p:ph idx="1"/>
-          </p:nvPr>
-        </p:nvSpPr>
-        <p:spPr/>
-        <p:txBody>
-          <a:bodyPr/>
-          <a:lstStyle/>
-          <a:p>
-            <a:r>
-              <a:rPr lang="en-US" dirty="0" smtClean="0"/>
-              <a:t>Create </a:t>
-            </a:r>
-            <a:r>
-              <a:rPr lang="en-US" i="1" dirty="0" err="1" smtClean="0"/>
-              <a:t>requestAssigned</a:t>
-            </a:r>
-            <a:r>
-              <a:rPr lang="en-US" dirty="0" smtClean="0"/>
-              <a:t> Azure hub</a:t>
-            </a:r>
-          </a:p>
-          <a:p>
-            <a:endParaRPr lang="en-US" dirty="0" smtClean="0"/>
-          </a:p>
-          <a:p>
-            <a:r>
-              <a:rPr lang="en-US" dirty="0" smtClean="0"/>
-              <a:t>Create Shared Access Policy for publisher</a:t>
-            </a:r>
-          </a:p>
-        </p:txBody>
-      </p:sp>
-      <p:pic>
-        <p:nvPicPr>
-          <p:cNvPr id="4" name="Picture 3"/>
-          <p:cNvPicPr>
-            <a:picLocks noChangeAspect="1"/>
-          </p:cNvPicPr>
-          <p:nvPr/>
-        </p:nvPicPr>
-        <p:blipFill>
-          <a:blip r:embed="rId2" cstate="print">
-            <a:extLst>
-              <a:ext uri="{28A0092B-C50C-407E-A947-70E740481C1C}">
-                <a14:useLocalDpi xmlns:a14="http://schemas.microsoft.com/office/drawing/2010/main" val="0"/>
-              </a:ext>
-            </a:extLst>
-          </a:blip>
-          <a:stretch>
-            <a:fillRect/>
-          </a:stretch>
-        </p:blipFill>
-        <p:spPr>
-          <a:xfrm>
-            <a:off x="9135291" y="274630"/>
-            <a:ext cx="2455817" cy="1381224"/>
-          </a:xfrm>
-          <a:prstGeom prst="rect">
-            <a:avLst/>
-          </a:prstGeom>
-        </p:spPr>
-      </p:pic>
-    </p:spTree>
-    <p:extLst>
-      <p:ext uri="{BB962C8B-B14F-4D97-AF65-F5344CB8AC3E}">
-        <p14:creationId xmlns:p14="http://schemas.microsoft.com/office/powerpoint/2010/main" val="1412090588"/>
-      </p:ext>
-    </p:extLst>
-  </p:cSld>
-  <p:clrMapOvr>
-    <a:masterClrMapping/>
-  </p:clrMapOvr>
-</p:sld>
-</file>
-
-<file path=ppt/slides/slide12.xml><?xml version="1.0" encoding="utf-8"?>
-<p:sld xmlns:a="http://schemas.openxmlformats.org/drawingml/2006/main" xmlns:r="http://schemas.openxmlformats.org/officeDocument/2006/relationships" xmlns:p="http://schemas.openxmlformats.org/presentationml/2006/main">
-  <p:cSld>
-    <p:spTree>
-      <p:nvGrpSpPr>
-        <p:cNvPr id="1" name=""/>
-        <p:cNvGrpSpPr/>
-        <p:nvPr/>
-      </p:nvGrpSpPr>
-      <p:grpSpPr>
-        <a:xfrm>
-          <a:off x="0" y="0"/>
-          <a:ext cx="0" cy="0"/>
-          <a:chOff x="0" y="0"/>
-          <a:chExt cx="0" cy="0"/>
-        </a:xfrm>
-      </p:grpSpPr>
-      <p:sp>
-        <p:nvSpPr>
-          <p:cNvPr id="2" name="Title 1"/>
-          <p:cNvSpPr>
-            <a:spLocks noGrp="1"/>
-          </p:cNvSpPr>
-          <p:nvPr>
-            <p:ph type="title"/>
-          </p:nvPr>
-        </p:nvSpPr>
-        <p:spPr/>
-        <p:txBody>
-          <a:bodyPr/>
-          <a:lstStyle/>
-          <a:p>
-            <a:r>
-              <a:rPr lang="en-US" dirty="0"/>
-              <a:t>T</a:t>
-            </a:r>
-            <a:r>
-              <a:rPr lang="en-US" dirty="0" smtClean="0"/>
-              <a:t>ask 4-4: Update UI to Display Assigned Request</a:t>
-            </a:r>
-            <a:endParaRPr lang="en-US" dirty="0"/>
-          </a:p>
-        </p:txBody>
-      </p:sp>
-      <p:sp>
-        <p:nvSpPr>
-          <p:cNvPr id="3" name="Content Placeholder 2"/>
-          <p:cNvSpPr>
-            <a:spLocks noGrp="1"/>
-          </p:cNvSpPr>
-          <p:nvPr>
-            <p:ph idx="1"/>
-          </p:nvPr>
-        </p:nvSpPr>
-        <p:spPr/>
-        <p:txBody>
-          <a:bodyPr/>
-          <a:lstStyle/>
-          <a:p>
-            <a:endParaRPr lang="en-US" dirty="0" smtClean="0"/>
-          </a:p>
-        </p:txBody>
-      </p:sp>
-      <p:pic>
-        <p:nvPicPr>
-          <p:cNvPr id="4" name="Picture 3"/>
-          <p:cNvPicPr>
-            <a:picLocks noChangeAspect="1"/>
-          </p:cNvPicPr>
-          <p:nvPr/>
-        </p:nvPicPr>
-        <p:blipFill>
-          <a:blip r:embed="rId2" cstate="print">
-            <a:extLst>
-              <a:ext uri="{28A0092B-C50C-407E-A947-70E740481C1C}">
-                <a14:useLocalDpi xmlns:a14="http://schemas.microsoft.com/office/drawing/2010/main" val="0"/>
-              </a:ext>
-            </a:extLst>
-          </a:blip>
-          <a:stretch>
-            <a:fillRect/>
-          </a:stretch>
-        </p:blipFill>
-        <p:spPr>
-          <a:xfrm>
-            <a:off x="9135291" y="274630"/>
-            <a:ext cx="2455817" cy="1381224"/>
-          </a:xfrm>
-          <a:prstGeom prst="rect">
-            <a:avLst/>
-          </a:prstGeom>
-        </p:spPr>
-      </p:pic>
-    </p:spTree>
-    <p:extLst>
-      <p:ext uri="{BB962C8B-B14F-4D97-AF65-F5344CB8AC3E}">
-        <p14:creationId xmlns:p14="http://schemas.microsoft.com/office/powerpoint/2010/main" val="235141703"/>
-      </p:ext>
-    </p:extLst>
-  </p:cSld>
-  <p:clrMapOvr>
-    <a:masterClrMapping/>
-  </p:clrMapOvr>
-</p:sld>
-</file>
-
-<file path=ppt/slides/slide13.xml><?xml version="1.0" encoding="utf-8"?>
-<p:sld xmlns:a="http://schemas.openxmlformats.org/drawingml/2006/main" xmlns:r="http://schemas.openxmlformats.org/officeDocument/2006/relationships" xmlns:p="http://schemas.openxmlformats.org/presentationml/2006/main">
-  <p:cSld>
-    <p:spTree>
-      <p:nvGrpSpPr>
-        <p:cNvPr id="1" name=""/>
-        <p:cNvGrpSpPr/>
-        <p:nvPr/>
-      </p:nvGrpSpPr>
-      <p:grpSpPr>
-        <a:xfrm>
-          <a:off x="0" y="0"/>
-          <a:ext cx="0" cy="0"/>
-          <a:chOff x="0" y="0"/>
-          <a:chExt cx="0" cy="0"/>
-        </a:xfrm>
-      </p:grpSpPr>
-      <p:sp>
-        <p:nvSpPr>
-          <p:cNvPr id="2" name="Title 1"/>
-          <p:cNvSpPr>
-            <a:spLocks noGrp="1"/>
-          </p:cNvSpPr>
-          <p:nvPr>
-            <p:ph type="title"/>
-          </p:nvPr>
-        </p:nvSpPr>
-        <p:spPr/>
-        <p:txBody>
-          <a:bodyPr/>
-          <a:lstStyle/>
-          <a:p>
-            <a:r>
-              <a:rPr lang="en-US" dirty="0" smtClean="0"/>
-              <a:t>Sprint </a:t>
-            </a:r>
-            <a:r>
-              <a:rPr lang="en-US" dirty="0"/>
-              <a:t>4</a:t>
-            </a:r>
-            <a:r>
-              <a:rPr lang="en-US" dirty="0" smtClean="0"/>
-              <a:t>: Retrospective</a:t>
-            </a:r>
-            <a:endParaRPr lang="en-US" dirty="0"/>
-          </a:p>
-        </p:txBody>
-      </p:sp>
-      <p:sp>
-        <p:nvSpPr>
-          <p:cNvPr id="3" name="Content Placeholder 2"/>
-          <p:cNvSpPr>
-            <a:spLocks noGrp="1"/>
-          </p:cNvSpPr>
-          <p:nvPr>
-            <p:ph idx="1"/>
-          </p:nvPr>
-        </p:nvSpPr>
-        <p:spPr/>
-        <p:txBody>
-          <a:bodyPr>
-            <a:normAutofit fontScale="85000" lnSpcReduction="20000"/>
-          </a:bodyPr>
-          <a:lstStyle/>
-          <a:p>
-            <a:r>
-              <a:rPr lang="en-US" dirty="0" smtClean="0"/>
-              <a:t>We now have an end-to-end solution for managing requests for health-care services.</a:t>
-            </a:r>
-          </a:p>
-          <a:p>
-            <a:endParaRPr lang="en-US" dirty="0"/>
-          </a:p>
-          <a:p>
-            <a:r>
-              <a:rPr lang="en-US" dirty="0"/>
-              <a:t>A</a:t>
-            </a:r>
-            <a:r>
-              <a:rPr lang="en-US" dirty="0" smtClean="0"/>
-              <a:t>synchronous messaging can be used with the UI, just as it is for service-to-service communications.</a:t>
-            </a:r>
-          </a:p>
-          <a:p>
-            <a:endParaRPr lang="en-US" dirty="0"/>
-          </a:p>
-          <a:p>
-            <a:r>
-              <a:rPr lang="en-US" dirty="0" smtClean="0"/>
-              <a:t>Asynchronous messaging can include requests and responses in addition to event notifications.</a:t>
-            </a:r>
-          </a:p>
-          <a:p>
-            <a:pPr lvl="1"/>
-            <a:r>
-              <a:rPr lang="en-US" dirty="0" smtClean="0"/>
-              <a:t>In comparison to real-time request/response, such as HTTP, managing expected responses requires a different approach</a:t>
-            </a:r>
-          </a:p>
-          <a:p>
-            <a:pPr lvl="1"/>
-            <a:endParaRPr lang="en-US" dirty="0"/>
-          </a:p>
-          <a:p>
-            <a:r>
-              <a:rPr lang="en-US" dirty="0" smtClean="0"/>
-              <a:t>There can be multiple publishers of a single event.</a:t>
-            </a:r>
-          </a:p>
-          <a:p>
-            <a:pPr lvl="1"/>
-            <a:r>
-              <a:rPr lang="en-US" dirty="0" smtClean="0"/>
-              <a:t>Consider a field to identify publisher</a:t>
-            </a:r>
-          </a:p>
-        </p:txBody>
-      </p:sp>
-      <p:pic>
-        <p:nvPicPr>
-          <p:cNvPr id="4" name="Picture 3"/>
-          <p:cNvPicPr>
-            <a:picLocks noChangeAspect="1"/>
-          </p:cNvPicPr>
-          <p:nvPr/>
-        </p:nvPicPr>
-        <p:blipFill>
-          <a:blip r:embed="rId2" cstate="print">
-            <a:extLst>
-              <a:ext uri="{28A0092B-C50C-407E-A947-70E740481C1C}">
-                <a14:useLocalDpi xmlns:a14="http://schemas.microsoft.com/office/drawing/2010/main" val="0"/>
-              </a:ext>
-            </a:extLst>
-          </a:blip>
-          <a:stretch>
-            <a:fillRect/>
-          </a:stretch>
-        </p:blipFill>
-        <p:spPr>
-          <a:xfrm>
-            <a:off x="9135291" y="274630"/>
-            <a:ext cx="2455817" cy="1381224"/>
-          </a:xfrm>
-          <a:prstGeom prst="rect">
-            <a:avLst/>
-          </a:prstGeom>
-        </p:spPr>
-      </p:pic>
-    </p:spTree>
-    <p:extLst>
-      <p:ext uri="{BB962C8B-B14F-4D97-AF65-F5344CB8AC3E}">
-        <p14:creationId xmlns:p14="http://schemas.microsoft.com/office/powerpoint/2010/main" val="2605596683"/>
-      </p:ext>
-    </p:extLst>
-  </p:cSld>
-  <p:clrMapOvr>
-    <a:masterClrMapping/>
-  </p:clrMapOvr>
-</p:sld>
-</file>
-
-<file path=ppt/slides/slide14.xml><?xml version="1.0" encoding="utf-8"?>
-<p:sld xmlns:a="http://schemas.openxmlformats.org/drawingml/2006/main" xmlns:r="http://schemas.openxmlformats.org/officeDocument/2006/relationships" xmlns:p="http://schemas.openxmlformats.org/presentationml/2006/main">
-  <p:cSld>
-    <p:spTree>
-      <p:nvGrpSpPr>
-        <p:cNvPr id="1" name=""/>
-        <p:cNvGrpSpPr/>
-        <p:nvPr/>
-      </p:nvGrpSpPr>
-      <p:grpSpPr>
-        <a:xfrm>
-          <a:off x="0" y="0"/>
-          <a:ext cx="0" cy="0"/>
-          <a:chOff x="0" y="0"/>
-          <a:chExt cx="0" cy="0"/>
-        </a:xfrm>
-      </p:grpSpPr>
-      <p:sp>
-        <p:nvSpPr>
-          <p:cNvPr id="2" name="Title 1"/>
-          <p:cNvSpPr>
-            <a:spLocks noGrp="1"/>
-          </p:cNvSpPr>
-          <p:nvPr>
-            <p:ph type="title"/>
-          </p:nvPr>
-        </p:nvSpPr>
-        <p:spPr/>
-        <p:txBody>
-          <a:bodyPr/>
-          <a:lstStyle/>
-          <a:p>
-            <a:r>
-              <a:rPr lang="en-US" dirty="0" smtClean="0"/>
-              <a:t>Azure App Service</a:t>
-            </a:r>
-            <a:endParaRPr lang="en-US" dirty="0"/>
-          </a:p>
-        </p:txBody>
-      </p:sp>
-      <p:sp>
-        <p:nvSpPr>
-          <p:cNvPr id="3" name="Content Placeholder 2"/>
-          <p:cNvSpPr>
-            <a:spLocks noGrp="1"/>
-          </p:cNvSpPr>
-          <p:nvPr>
-            <p:ph idx="1"/>
-          </p:nvPr>
-        </p:nvSpPr>
-        <p:spPr/>
-        <p:txBody>
-          <a:bodyPr>
-            <a:normAutofit lnSpcReduction="10000"/>
-          </a:bodyPr>
-          <a:lstStyle/>
-          <a:p>
-            <a:r>
-              <a:rPr lang="en-US" dirty="0" smtClean="0"/>
-              <a:t>Azure’s PaaS option for hosting applications and containers</a:t>
-            </a:r>
-          </a:p>
-          <a:p>
-            <a:endParaRPr lang="en-US" dirty="0" smtClean="0"/>
-          </a:p>
-          <a:p>
-            <a:r>
-              <a:rPr lang="en-US" dirty="0" smtClean="0"/>
-              <a:t>Key terms</a:t>
-            </a:r>
-          </a:p>
-          <a:p>
-            <a:pPr lvl="1"/>
-            <a:r>
-              <a:rPr lang="en-US" dirty="0" smtClean="0"/>
-              <a:t>App Service Plan</a:t>
-            </a:r>
-          </a:p>
-          <a:p>
-            <a:pPr lvl="1"/>
-            <a:endParaRPr lang="en-US" dirty="0" smtClean="0"/>
-          </a:p>
-          <a:p>
-            <a:r>
-              <a:rPr lang="en-US" dirty="0" smtClean="0"/>
-              <a:t>Features</a:t>
-            </a:r>
-          </a:p>
-          <a:p>
-            <a:pPr lvl="1"/>
-            <a:r>
-              <a:rPr lang="en-US" dirty="0" smtClean="0"/>
-              <a:t>Reliable</a:t>
-            </a:r>
-          </a:p>
-          <a:p>
-            <a:pPr lvl="1"/>
-            <a:r>
-              <a:rPr lang="en-US" dirty="0" smtClean="0"/>
-              <a:t>Scalable</a:t>
-            </a:r>
-          </a:p>
-          <a:p>
-            <a:pPr lvl="1"/>
-            <a:r>
-              <a:rPr lang="en-US" dirty="0" smtClean="0"/>
-              <a:t>CI/CI integration</a:t>
-            </a:r>
-          </a:p>
-          <a:p>
-            <a:pPr lvl="1"/>
-            <a:r>
-              <a:rPr lang="en-US" dirty="0" smtClean="0"/>
-              <a:t>Great integration for </a:t>
-            </a:r>
-            <a:r>
-              <a:rPr lang="en-US" dirty="0" err="1" smtClean="0"/>
-              <a:t>ASP.Net</a:t>
-            </a:r>
-            <a:r>
-              <a:rPr lang="en-US" dirty="0" smtClean="0"/>
-              <a:t> applications</a:t>
-            </a:r>
-            <a:endParaRPr lang="en-US" dirty="0"/>
-          </a:p>
-        </p:txBody>
-      </p:sp>
-    </p:spTree>
-    <p:extLst>
-      <p:ext uri="{BB962C8B-B14F-4D97-AF65-F5344CB8AC3E}">
-        <p14:creationId xmlns:p14="http://schemas.microsoft.com/office/powerpoint/2010/main" val="3900644337"/>
+        <p14:creationId xmlns:p14="http://schemas.microsoft.com/office/powerpoint/2010/main" val="1151348957"/>
       </p:ext>
     </p:extLst>
   </p:cSld>
@@ -3722,7 +3056,7 @@
       </p:grpSpPr>
       <p:sp>
         <p:nvSpPr>
-          <p:cNvPr id="4" name="Title 3"/>
+          <p:cNvPr id="2" name="Title 1"/>
           <p:cNvSpPr>
             <a:spLocks noGrp="1"/>
           </p:cNvSpPr>
@@ -3737,7 +3071,15 @@
           <a:p>
             <a:r>
               <a:rPr lang="en-US" dirty="0" smtClean="0"/>
-              <a:t>To Do</a:t>
+              <a:t>User Story </a:t>
+            </a:r>
+            <a:r>
+              <a:rPr lang="en-US" dirty="0"/>
+              <a:t>4</a:t>
+            </a:r>
+            <a:r>
+              <a:rPr lang="en-US" dirty="0" smtClean="0"/>
+              <a:t>-1</a:t>
             </a:r>
             <a:endParaRPr lang="en-US" dirty="0"/>
           </a:p>
@@ -3745,7 +3087,7 @@
       </p:sp>
       <p:sp>
         <p:nvSpPr>
-          <p:cNvPr id="5" name="Content Placeholder 4"/>
+          <p:cNvPr id="3" name="Content Placeholder 2"/>
           <p:cNvSpPr>
             <a:spLocks noGrp="1"/>
           </p:cNvSpPr>
@@ -3756,97 +3098,54 @@
         <p:spPr/>
         <p:txBody>
           <a:bodyPr>
-            <a:normAutofit fontScale="85000" lnSpcReduction="20000"/>
+            <a:normAutofit/>
           </a:bodyPr>
           <a:lstStyle/>
           <a:p>
+            <a:pPr marL="0" indent="0">
+              <a:buNone/>
+            </a:pPr>
             <a:r>
               <a:rPr lang="en-US" dirty="0" smtClean="0"/>
-              <a:t>Get request</a:t>
-            </a:r>
-          </a:p>
-          <a:p>
-            <a:pPr lvl="1"/>
-            <a:r>
-              <a:rPr lang="en-US" dirty="0" smtClean="0"/>
-              <a:t>Handle no current request</a:t>
-            </a:r>
-          </a:p>
-          <a:p>
-            <a:r>
-              <a:rPr lang="en-US" dirty="0" smtClean="0"/>
-              <a:t>Approve / Disapprove</a:t>
-            </a:r>
-          </a:p>
-          <a:p>
-            <a:r>
-              <a:rPr lang="en-US" dirty="0" smtClean="0"/>
-              <a:t>Clean Login Screen</a:t>
-            </a:r>
-          </a:p>
-          <a:p>
-            <a:r>
-              <a:rPr lang="en-US" dirty="0" smtClean="0"/>
-              <a:t>Starting point</a:t>
-            </a:r>
-          </a:p>
-          <a:p>
-            <a:pPr lvl="1"/>
-            <a:r>
-              <a:rPr lang="en-US" dirty="0" smtClean="0"/>
-              <a:t>UI with a hard-coded, but dynamic request</a:t>
-            </a:r>
-          </a:p>
-          <a:p>
-            <a:pPr lvl="1"/>
-            <a:r>
-              <a:rPr lang="en-US" dirty="0" smtClean="0"/>
-              <a:t>Disabled dashboard</a:t>
-            </a:r>
-            <a:endParaRPr lang="en-US" dirty="0"/>
-          </a:p>
-          <a:p>
-            <a:r>
-              <a:rPr lang="en-US" dirty="0" smtClean="0"/>
-              <a:t>Stats for manually approved/disapproved</a:t>
-            </a:r>
-          </a:p>
-          <a:p>
-            <a:pPr lvl="1"/>
-            <a:r>
-              <a:rPr lang="en-US" dirty="0" smtClean="0"/>
-              <a:t>Assigned?</a:t>
-            </a:r>
-            <a:endParaRPr lang="en-US" dirty="0"/>
-          </a:p>
-          <a:p>
-            <a:r>
-              <a:rPr lang="en-US" dirty="0" smtClean="0"/>
-              <a:t>Make stats viewable from decision screen</a:t>
-            </a:r>
-            <a:endParaRPr lang="en-US" dirty="0"/>
-          </a:p>
-          <a:p>
-            <a:r>
-              <a:rPr lang="en-US" dirty="0"/>
-              <a:t>Final solution for sprint 5</a:t>
-            </a:r>
-          </a:p>
-          <a:p>
-            <a:r>
-              <a:rPr lang="en-US" dirty="0"/>
-              <a:t>Arm scrips for sprint 5</a:t>
-            </a:r>
-          </a:p>
-          <a:p>
-            <a:endParaRPr lang="en-US" dirty="0"/>
-          </a:p>
-        </p:txBody>
-      </p:sp>
+              <a:t>TODO</a:t>
+            </a:r>
+          </a:p>
+        </p:txBody>
+      </p:sp>
+      <p:pic>
+        <p:nvPicPr>
+          <p:cNvPr id="5" name="Picture 4"/>
+          <p:cNvPicPr>
+            <a:picLocks noChangeAspect="1"/>
+          </p:cNvPicPr>
+          <p:nvPr/>
+        </p:nvPicPr>
+        <p:blipFill>
+          <a:blip r:embed="rId2" cstate="print">
+            <a:extLst>
+              <a:ext uri="{28A0092B-C50C-407E-A947-70E740481C1C}">
+                <a14:useLocalDpi xmlns:a14="http://schemas.microsoft.com/office/drawing/2010/main" val="0"/>
+              </a:ext>
+            </a:extLst>
+          </a:blip>
+          <a:stretch>
+            <a:fillRect/>
+          </a:stretch>
+        </p:blipFill>
+        <p:spPr>
+          <a:xfrm>
+            <a:off x="9135291" y="292047"/>
+            <a:ext cx="2455817" cy="1381224"/>
+          </a:xfrm>
+          <a:prstGeom prst="rect">
+            <a:avLst/>
+          </a:prstGeom>
+        </p:spPr>
+      </p:pic>
     </p:spTree>
     <p:extLst>
       <p:ext uri="{BB962C8B-B14F-4D97-AF65-F5344CB8AC3E}">
-        <p14:creationId xmlns:p14="http://schemas.microsoft.com/office/powerpoint/2010/main" val="3643911036"/>
+        <p14:creationId xmlns:p14="http://schemas.microsoft.com/office/powerpoint/2010/main" val="1775686179"/>
       </p:ext>
     </p:extLst>
   </p:cSld>
@@ -3893,12 +3192,12 @@
               <a:t>User Story </a:t>
             </a:r>
             <a:r>
-              <a:rPr lang="en-US" dirty="0"/>
-              <a:t>4</a:t>
-            </a:r>
-            <a:r>
               <a:rPr lang="en-US" dirty="0" smtClean="0"/>
-              <a:t>-1</a:t>
+              <a:t>4-1</a:t>
+            </a:r>
+            <a:r>
+              <a:rPr lang="en-US" dirty="0" smtClean="0"/>
+              <a:t>: Design</a:t>
             </a:r>
             <a:endParaRPr lang="en-US" dirty="0"/>
           </a:p>
@@ -3926,59 +3225,14 @@
             </a:pPr>
             <a:r>
               <a:rPr lang="en-US" dirty="0" smtClean="0"/>
-              <a:t>As a TAH physician, I need to be able to view requests that have not been automatically approved so that I can determine if they should be approved or not.</a:t>
-            </a:r>
-          </a:p>
-          <a:p>
-            <a:pPr marL="0" indent="0">
-              <a:buNone/>
-            </a:pPr>
-            <a:endParaRPr lang="en-US" dirty="0" smtClean="0"/>
-          </a:p>
-          <a:p>
-            <a:pPr marL="0" indent="0">
-              <a:buNone/>
-            </a:pPr>
-            <a:r>
-              <a:rPr lang="en-US" dirty="0" smtClean="0"/>
-              <a:t>Acceptance Criteria</a:t>
-            </a:r>
-          </a:p>
-          <a:p>
-            <a:pPr marL="457200" indent="-457200">
-              <a:buFont typeface="+mj-lt"/>
-              <a:buAutoNum type="arabicPeriod"/>
-            </a:pPr>
-            <a:r>
-              <a:rPr lang="en-US" dirty="0" smtClean="0"/>
-              <a:t>Retrieve a request that has not been automatically approved</a:t>
-            </a:r>
-          </a:p>
-          <a:p>
-            <a:pPr marL="457200" indent="-457200">
-              <a:buFont typeface="+mj-lt"/>
-              <a:buAutoNum type="arabicPeriod"/>
-            </a:pPr>
-            <a:r>
-              <a:rPr lang="en-US" dirty="0" smtClean="0"/>
-              <a:t>View request details</a:t>
-            </a:r>
-          </a:p>
-          <a:p>
-            <a:pPr marL="457200" indent="-457200">
-              <a:buFont typeface="+mj-lt"/>
-              <a:buAutoNum type="arabicPeriod"/>
-            </a:pPr>
-            <a:r>
-              <a:rPr lang="en-US" dirty="0" smtClean="0"/>
-              <a:t>Approve or disapprove the request</a:t>
+              <a:t>TODO</a:t>
             </a:r>
           </a:p>
         </p:txBody>
       </p:sp>
       <p:pic>
         <p:nvPicPr>
-          <p:cNvPr id="4" name="Picture 3"/>
+          <p:cNvPr id="5" name="Picture 4"/>
           <p:cNvPicPr>
             <a:picLocks noChangeAspect="1"/>
           </p:cNvPicPr>
@@ -3998,7 +3252,7 @@
         </p:blipFill>
         <p:spPr>
           <a:xfrm>
-            <a:off x="9135291" y="274630"/>
+            <a:off x="9135291" y="292047"/>
             <a:ext cx="2455817" cy="1381224"/>
           </a:xfrm>
           <a:prstGeom prst="rect">
@@ -4009,7 +3263,7 @@
     </p:spTree>
     <p:extLst>
       <p:ext uri="{BB962C8B-B14F-4D97-AF65-F5344CB8AC3E}">
-        <p14:creationId xmlns:p14="http://schemas.microsoft.com/office/powerpoint/2010/main" val="3081871758"/>
+        <p14:creationId xmlns:p14="http://schemas.microsoft.com/office/powerpoint/2010/main" val="3512360076"/>
       </p:ext>
     </p:extLst>
   </p:cSld>
@@ -4052,12 +3306,8 @@
           <a:lstStyle/>
           <a:p>
             <a:r>
-              <a:rPr lang="en-US" dirty="0"/>
-              <a:t>User Story </a:t>
-            </a:r>
-            <a:r>
               <a:rPr lang="en-US" dirty="0" smtClean="0"/>
-              <a:t>4-1: Current Status</a:t>
+              <a:t>New Requirement</a:t>
             </a:r>
             <a:endParaRPr lang="en-US" dirty="0"/>
           </a:p>
@@ -4075,110 +3325,20 @@
         </p:nvSpPr>
         <p:spPr/>
         <p:txBody>
-          <a:bodyPr>
-            <a:normAutofit/>
-          </a:bodyPr>
+          <a:bodyPr/>
           <a:lstStyle/>
           <a:p>
             <a:r>
               <a:rPr lang="en-US" dirty="0" smtClean="0"/>
-              <a:t>UI already exists</a:t>
-            </a:r>
-            <a:r>
-              <a:rPr lang="en-US" dirty="0"/>
-              <a:t> </a:t>
-            </a:r>
-            <a:r>
-              <a:rPr lang="en-US" dirty="0" smtClean="0"/>
-              <a:t>with the ability to view a static request for service. </a:t>
-            </a:r>
-          </a:p>
-          <a:p>
-            <a:pPr lvl="1"/>
-            <a:r>
-              <a:rPr lang="en-US" dirty="0" smtClean="0"/>
-              <a:t>It does not have the ability to retrieve a request from the routing service.</a:t>
-            </a:r>
-          </a:p>
-          <a:p>
-            <a:pPr lvl="1"/>
-            <a:endParaRPr lang="en-US" dirty="0" smtClean="0"/>
-          </a:p>
-          <a:p>
-            <a:r>
-              <a:rPr lang="en-US" dirty="0" smtClean="0"/>
-              <a:t>UI developed in </a:t>
-            </a:r>
-            <a:r>
-              <a:rPr lang="en-US" dirty="0" err="1" smtClean="0"/>
-              <a:t>Blazor</a:t>
-            </a:r>
-            <a:r>
-              <a:rPr lang="en-US" dirty="0" smtClean="0"/>
-              <a:t>, but </a:t>
-            </a:r>
-            <a:r>
-              <a:rPr lang="en-US" dirty="0" err="1" smtClean="0"/>
-              <a:t>Blazor</a:t>
-            </a:r>
-            <a:r>
-              <a:rPr lang="en-US" dirty="0" smtClean="0"/>
-              <a:t> knowledge not required. </a:t>
-            </a:r>
-          </a:p>
-          <a:p>
-            <a:pPr lvl="1"/>
-            <a:r>
-              <a:rPr lang="en-US" dirty="0" err="1" smtClean="0"/>
-              <a:t>Blazor</a:t>
-            </a:r>
-            <a:r>
-              <a:rPr lang="en-US" dirty="0" smtClean="0"/>
-              <a:t> is a Microsoft ASP.NET tool for creating web UIs with C# instead of JavaScript, but can easily call JavaScript APIs and libraries.</a:t>
-            </a:r>
-          </a:p>
-          <a:p>
-            <a:pPr marL="0" indent="0">
-              <a:buNone/>
-            </a:pPr>
-            <a:endParaRPr lang="en-US" dirty="0" smtClean="0"/>
-          </a:p>
-        </p:txBody>
-      </p:sp>
-      <p:pic>
-        <p:nvPicPr>
-          <p:cNvPr id="4" name="Picture 3"/>
-          <p:cNvPicPr>
-            <a:picLocks noChangeAspect="1"/>
-          </p:cNvPicPr>
-          <p:nvPr/>
-        </p:nvPicPr>
-        <p:blipFill>
-          <a:blip r:embed="rId2" cstate="print">
-            <a:extLst>
-              <a:ext uri="{28A0092B-C50C-407E-A947-70E740481C1C}">
-                <a14:useLocalDpi xmlns:a14="http://schemas.microsoft.com/office/drawing/2010/main" val="0"/>
-              </a:ext>
-            </a:extLst>
-          </a:blip>
-          <a:stretch>
-            <a:fillRect/>
-          </a:stretch>
-        </p:blipFill>
-        <p:spPr>
-          <a:xfrm>
-            <a:off x="9135291" y="274630"/>
-            <a:ext cx="2455817" cy="1381224"/>
-          </a:xfrm>
-          <a:prstGeom prst="rect">
-            <a:avLst/>
-          </a:prstGeom>
-        </p:spPr>
-      </p:pic>
+              <a:t>??? Should be something that just consumes existing event/s</a:t>
+            </a:r>
+          </a:p>
+        </p:txBody>
+      </p:sp>
     </p:spTree>
     <p:extLst>
       <p:ext uri="{BB962C8B-B14F-4D97-AF65-F5344CB8AC3E}">
-        <p14:creationId xmlns:p14="http://schemas.microsoft.com/office/powerpoint/2010/main" val="1987503314"/>
+        <p14:creationId xmlns:p14="http://schemas.microsoft.com/office/powerpoint/2010/main" val="2417712017"/>
       </p:ext>
     </p:extLst>
   </p:cSld>
@@ -4221,8 +3381,24 @@
           <a:lstStyle/>
           <a:p>
             <a:r>
+              <a:rPr lang="en-US" dirty="0"/>
+              <a:t>T</a:t>
+            </a:r>
+            <a:r>
               <a:rPr lang="en-US" dirty="0" smtClean="0"/>
-              <a:t>Command vs Event</a:t>
+              <a:t>ask </a:t>
+            </a:r>
+            <a:r>
+              <a:rPr lang="en-US" dirty="0"/>
+              <a:t>4</a:t>
+            </a:r>
+            <a:r>
+              <a:rPr lang="en-US" dirty="0" smtClean="0"/>
+              <a:t>-1</a:t>
+            </a:r>
+            <a:r>
+              <a:rPr lang="en-US" dirty="0" smtClean="0"/>
+              <a:t>:</a:t>
             </a:r>
             <a:endParaRPr lang="en-US" dirty="0"/>
           </a:p>
@@ -4244,41 +3420,46 @@
           <a:lstStyle/>
           <a:p>
             <a:r>
-              <a:rPr lang="en-US" b="1" i="1" dirty="0" smtClean="0"/>
-              <a:t>Event</a:t>
-            </a:r>
-            <a:r>
               <a:rPr lang="en-US" dirty="0" smtClean="0"/>
-              <a:t> is something that has already occurred in the system</a:t>
-            </a:r>
-          </a:p>
-          <a:p>
-            <a:endParaRPr lang="en-US" dirty="0" smtClean="0"/>
-          </a:p>
-          <a:p>
-            <a:r>
-              <a:rPr lang="en-US" b="1" i="1" dirty="0" smtClean="0"/>
-              <a:t>Command</a:t>
-            </a:r>
-            <a:r>
-              <a:rPr lang="en-US" dirty="0" smtClean="0"/>
-              <a:t> is something that someone or some component needs to be done and typically expects some form of response</a:t>
-            </a:r>
-          </a:p>
-          <a:p>
-            <a:pPr lvl="1"/>
-            <a:r>
-              <a:rPr lang="en-US" dirty="0" smtClean="0"/>
-              <a:t>The execution of a command can generate many events</a:t>
-            </a:r>
-            <a:endParaRPr lang="en-US" dirty="0"/>
-          </a:p>
-        </p:txBody>
-      </p:sp>
+              <a:t>TODO</a:t>
+            </a:r>
+          </a:p>
+        </p:txBody>
+      </p:sp>
+      <p:pic>
+        <p:nvPicPr>
+          <p:cNvPr id="4" name="Picture 3"/>
+          <p:cNvPicPr>
+            <a:picLocks noChangeAspect="1"/>
+          </p:cNvPicPr>
+          <p:nvPr/>
+        </p:nvPicPr>
+        <p:blipFill>
+          <a:blip r:embed="rId2" cstate="print">
+            <a:extLst>
+              <a:ext uri="{28A0092B-C50C-407E-A947-70E740481C1C}">
+                <a14:useLocalDpi xmlns:a14="http://schemas.microsoft.com/office/drawing/2010/main" val="0"/>
+              </a:ext>
+            </a:extLst>
+          </a:blip>
+          <a:stretch>
+            <a:fillRect/>
+          </a:stretch>
+        </p:blipFill>
+        <p:spPr>
+          <a:xfrm>
+            <a:off x="9135291" y="292047"/>
+            <a:ext cx="2455817" cy="1381224"/>
+          </a:xfrm>
+          <a:prstGeom prst="rect">
+            <a:avLst/>
+          </a:prstGeom>
+        </p:spPr>
+      </p:pic>
     </p:spTree>
     <p:extLst>
       <p:ext uri="{BB962C8B-B14F-4D97-AF65-F5344CB8AC3E}">
-        <p14:creationId xmlns:p14="http://schemas.microsoft.com/office/powerpoint/2010/main" val="2153873207"/>
+        <p14:creationId xmlns:p14="http://schemas.microsoft.com/office/powerpoint/2010/main" val="1322869297"/>
       </p:ext>
     </p:extLst>
   </p:cSld>
@@ -4321,12 +3502,16 @@
           <a:lstStyle/>
           <a:p>
             <a:r>
-              <a:rPr lang="en-US" dirty="0"/>
-              <a:t>User Story </a:t>
+              <a:rPr lang="en-US" smtClean="0"/>
+              <a:t>Sprint </a:t>
+            </a:r>
+            <a:r>
+              <a:rPr lang="en-US" smtClean="0"/>
+              <a:t>4: </a:t>
             </a:r>
             <a:r>
               <a:rPr lang="en-US" dirty="0" smtClean="0"/>
-              <a:t>4-1: Design</a:t>
+              <a:t>Retrospective</a:t>
             </a:r>
             <a:endParaRPr lang="en-US" dirty="0"/>
           </a:p>
@@ -4344,572 +3529,14 @@
         </p:nvSpPr>
         <p:spPr/>
         <p:txBody>
-          <a:bodyPr>
-            <a:normAutofit/>
-          </a:bodyPr>
-          <a:lstStyle/>
-          <a:p>
-            <a:endParaRPr lang="en-US" dirty="0" smtClean="0"/>
-          </a:p>
-          <a:p>
+          <a:bodyPr/>
+          <a:lstStyle/>
+          <a:p>
+            <a:r>
+              <a:rPr lang="en-US" dirty="0" smtClean="0"/>
+              <a:t>TODO</a:t>
+            </a:r>
             <a:endParaRPr lang="en-US" dirty="0"/>
-          </a:p>
-          <a:p>
-            <a:endParaRPr lang="en-US" dirty="0" smtClean="0"/>
-          </a:p>
-          <a:p>
-            <a:endParaRPr lang="en-US" dirty="0"/>
-          </a:p>
-          <a:p>
-            <a:endParaRPr lang="en-US" dirty="0" smtClean="0"/>
-          </a:p>
-        </p:txBody>
-      </p:sp>
-      <p:pic>
-        <p:nvPicPr>
-          <p:cNvPr id="4" name="Picture 3"/>
-          <p:cNvPicPr>
-            <a:picLocks noChangeAspect="1"/>
-          </p:cNvPicPr>
-          <p:nvPr/>
-        </p:nvPicPr>
-        <p:blipFill>
-          <a:blip r:embed="rId2"/>
-          <a:stretch>
-            <a:fillRect/>
-          </a:stretch>
-        </p:blipFill>
-        <p:spPr>
-          <a:xfrm>
-            <a:off x="3472681" y="1455556"/>
-            <a:ext cx="5270726" cy="5167193"/>
-          </a:xfrm>
-          <a:prstGeom prst="rect">
-            <a:avLst/>
-          </a:prstGeom>
-        </p:spPr>
-      </p:pic>
-      <p:pic>
-        <p:nvPicPr>
-          <p:cNvPr id="5" name="Picture 4"/>
-          <p:cNvPicPr>
-            <a:picLocks noChangeAspect="1"/>
-          </p:cNvPicPr>
-          <p:nvPr/>
-        </p:nvPicPr>
-        <p:blipFill>
-          <a:blip r:embed="rId3" cstate="print">
-            <a:extLst>
-              <a:ext uri="{28A0092B-C50C-407E-A947-70E740481C1C}">
-                <a14:useLocalDpi xmlns:a14="http://schemas.microsoft.com/office/drawing/2010/main" val="0"/>
-              </a:ext>
-            </a:extLst>
-          </a:blip>
-          <a:stretch>
-            <a:fillRect/>
-          </a:stretch>
-        </p:blipFill>
-        <p:spPr>
-          <a:xfrm>
-            <a:off x="9135291" y="274630"/>
-            <a:ext cx="2455817" cy="1381224"/>
-          </a:xfrm>
-          <a:prstGeom prst="rect">
-            <a:avLst/>
-          </a:prstGeom>
-        </p:spPr>
-      </p:pic>
-    </p:spTree>
-    <p:extLst>
-      <p:ext uri="{BB962C8B-B14F-4D97-AF65-F5344CB8AC3E}">
-        <p14:creationId xmlns:p14="http://schemas.microsoft.com/office/powerpoint/2010/main" val="1582362788"/>
-      </p:ext>
-    </p:extLst>
-  </p:cSld>
-  <p:clrMapOvr>
-    <a:masterClrMapping/>
-  </p:clrMapOvr>
-</p:sld>
-</file>
-
-<file path=ppt/slides/slide7.xml><?xml version="1.0" encoding="utf-8"?>
-<p:sld xmlns:a="http://schemas.openxmlformats.org/drawingml/2006/main" xmlns:r="http://schemas.openxmlformats.org/officeDocument/2006/relationships" xmlns:p="http://schemas.openxmlformats.org/presentationml/2006/main">
-  <p:cSld>
-    <p:spTree>
-      <p:nvGrpSpPr>
-        <p:cNvPr id="1" name=""/>
-        <p:cNvGrpSpPr/>
-        <p:nvPr/>
-      </p:nvGrpSpPr>
-      <p:grpSpPr>
-        <a:xfrm>
-          <a:off x="0" y="0"/>
-          <a:ext cx="0" cy="0"/>
-          <a:chOff x="0" y="0"/>
-          <a:chExt cx="0" cy="0"/>
-        </a:xfrm>
-      </p:grpSpPr>
-      <p:sp>
-        <p:nvSpPr>
-          <p:cNvPr id="2" name="Title 1"/>
-          <p:cNvSpPr>
-            <a:spLocks noGrp="1"/>
-          </p:cNvSpPr>
-          <p:nvPr>
-            <p:ph type="title"/>
-          </p:nvPr>
-        </p:nvSpPr>
-        <p:spPr/>
-        <p:txBody>
-          <a:bodyPr/>
-          <a:lstStyle/>
-          <a:p>
-            <a:r>
-              <a:rPr lang="en-US" dirty="0" smtClean="0"/>
-              <a:t>User Interface Application</a:t>
-            </a:r>
-            <a:endParaRPr lang="en-US" dirty="0"/>
-          </a:p>
-        </p:txBody>
-      </p:sp>
-      <p:sp>
-        <p:nvSpPr>
-          <p:cNvPr id="3" name="Content Placeholder 2"/>
-          <p:cNvSpPr>
-            <a:spLocks noGrp="1"/>
-          </p:cNvSpPr>
-          <p:nvPr>
-            <p:ph idx="1"/>
-          </p:nvPr>
-        </p:nvSpPr>
-        <p:spPr/>
-        <p:txBody>
-          <a:bodyPr>
-            <a:normAutofit fontScale="85000" lnSpcReduction="20000"/>
-          </a:bodyPr>
-          <a:lstStyle/>
-          <a:p>
-            <a:r>
-              <a:rPr lang="en-US" dirty="0" smtClean="0"/>
-              <a:t>Allows users to retrieve requests needing a decision based on their specialty</a:t>
-            </a:r>
-          </a:p>
-          <a:p>
-            <a:endParaRPr lang="en-US" dirty="0" smtClean="0"/>
-          </a:p>
-          <a:p>
-            <a:r>
-              <a:rPr lang="en-US" dirty="0" smtClean="0"/>
-              <a:t>Users can</a:t>
-            </a:r>
-          </a:p>
-          <a:p>
-            <a:pPr lvl="1"/>
-            <a:r>
-              <a:rPr lang="en-US" dirty="0" smtClean="0"/>
-              <a:t>Approve a request</a:t>
-            </a:r>
-          </a:p>
-          <a:p>
-            <a:pPr lvl="1"/>
-            <a:r>
-              <a:rPr lang="en-US" dirty="0" smtClean="0"/>
-              <a:t>Deny a request</a:t>
-            </a:r>
-          </a:p>
-          <a:p>
-            <a:pPr lvl="1"/>
-            <a:r>
-              <a:rPr lang="en-US" dirty="0" smtClean="0"/>
-              <a:t>Request additional information</a:t>
-            </a:r>
-          </a:p>
-          <a:p>
-            <a:endParaRPr lang="en-US" dirty="0" smtClean="0"/>
-          </a:p>
-          <a:p>
-            <a:r>
-              <a:rPr lang="en-US" dirty="0" smtClean="0"/>
-              <a:t>???Includes dashboard so users can track requests by specialty and status</a:t>
-            </a:r>
-          </a:p>
-          <a:p>
-            <a:endParaRPr lang="en-US" dirty="0" smtClean="0"/>
-          </a:p>
-          <a:p>
-            <a:r>
-              <a:rPr lang="en-US" dirty="0" smtClean="0"/>
-              <a:t>??? User is notified of changes to requests they’ve recently touched???</a:t>
-            </a:r>
-          </a:p>
-          <a:p>
-            <a:endParaRPr lang="en-US" dirty="0" smtClean="0"/>
-          </a:p>
-          <a:p>
-            <a:r>
-              <a:rPr lang="en-US" dirty="0" smtClean="0"/>
-              <a:t>Implemented as </a:t>
-            </a:r>
-            <a:r>
-              <a:rPr lang="en-US" dirty="0" err="1" smtClean="0"/>
-              <a:t>Blazor</a:t>
-            </a:r>
-            <a:r>
-              <a:rPr lang="en-US" dirty="0" smtClean="0"/>
-              <a:t> ??? Application and deployed as ???</a:t>
-            </a:r>
-          </a:p>
-        </p:txBody>
-      </p:sp>
-      <p:sp>
-        <p:nvSpPr>
-          <p:cNvPr id="4" name="Rectangle 3"/>
-          <p:cNvSpPr/>
-          <p:nvPr/>
-        </p:nvSpPr>
-        <p:spPr>
-          <a:xfrm>
-            <a:off x="9368444" y="0"/>
-            <a:ext cx="2676698" cy="2137202"/>
-          </a:xfrm>
-          <a:prstGeom prst="rect">
-            <a:avLst/>
-          </a:prstGeom>
-          <a:solidFill>
-            <a:srgbClr val="FFFF00"/>
-          </a:solidFill>
-        </p:spPr>
-        <p:style>
-          <a:lnRef idx="2">
-            <a:schemeClr val="accent1">
-              <a:shade val="50000"/>
-            </a:schemeClr>
-          </a:lnRef>
-          <a:fillRef idx="1">
-            <a:schemeClr val="accent1"/>
-          </a:fillRef>
-          <a:effectRef idx="0">
-            <a:schemeClr val="accent1"/>
-          </a:effectRef>
-          <a:fontRef idx="minor">
-            <a:schemeClr val="lt1"/>
-          </a:fontRef>
-        </p:style>
-        <p:txBody>
-          <a:bodyPr rtlCol="0" anchor="t" anchorCtr="0"/>
-          <a:lstStyle/>
-          <a:p>
-            <a:r>
-              <a:rPr lang="en-US" sz="1050" dirty="0" smtClean="0">
-                <a:solidFill>
-                  <a:schemeClr val="tx1"/>
-                </a:solidFill>
-              </a:rPr>
-              <a:t>Prep</a:t>
-            </a:r>
-          </a:p>
-          <a:p>
-            <a:pPr marL="285750" indent="-285750">
-              <a:buFontTx/>
-              <a:buChar char="-"/>
-            </a:pPr>
-            <a:r>
-              <a:rPr lang="en-US" sz="1050" dirty="0" smtClean="0">
-                <a:solidFill>
-                  <a:schemeClr val="tx1"/>
-                </a:solidFill>
-              </a:rPr>
-              <a:t>Shell application</a:t>
-            </a:r>
-          </a:p>
-          <a:p>
-            <a:pPr marL="742950" lvl="1" indent="-285750">
-              <a:buFontTx/>
-              <a:buChar char="-"/>
-            </a:pPr>
-            <a:r>
-              <a:rPr lang="en-US" sz="1050" dirty="0" smtClean="0">
-                <a:solidFill>
-                  <a:schemeClr val="tx1"/>
-                </a:solidFill>
-              </a:rPr>
-              <a:t>Login / select specialty</a:t>
-            </a:r>
-          </a:p>
-          <a:p>
-            <a:pPr marL="285750" indent="-285750">
-              <a:buFontTx/>
-              <a:buChar char="-"/>
-            </a:pPr>
-            <a:r>
-              <a:rPr lang="en-US" sz="1050" dirty="0" smtClean="0">
-                <a:solidFill>
-                  <a:schemeClr val="tx1"/>
-                </a:solidFill>
-              </a:rPr>
-              <a:t>View request</a:t>
-            </a:r>
-          </a:p>
-          <a:p>
-            <a:pPr marL="285750" indent="-285750">
-              <a:buFontTx/>
-              <a:buChar char="-"/>
-            </a:pPr>
-            <a:r>
-              <a:rPr lang="en-US" sz="1050" dirty="0" smtClean="0">
-                <a:solidFill>
-                  <a:schemeClr val="tx1"/>
-                </a:solidFill>
-              </a:rPr>
-              <a:t>Approve / deny / more info</a:t>
-            </a:r>
-          </a:p>
-          <a:p>
-            <a:pPr marL="285750" indent="-285750">
-              <a:buFontTx/>
-              <a:buChar char="-"/>
-            </a:pPr>
-            <a:r>
-              <a:rPr lang="en-US" sz="1050" dirty="0" smtClean="0">
-                <a:solidFill>
-                  <a:schemeClr val="tx1"/>
-                </a:solidFill>
-              </a:rPr>
-              <a:t>Dashboard???</a:t>
-            </a:r>
-          </a:p>
-          <a:p>
-            <a:pPr marL="285750" indent="-285750">
-              <a:buFontTx/>
-              <a:buChar char="-"/>
-            </a:pPr>
-            <a:endParaRPr lang="en-US" sz="1050" dirty="0">
-              <a:solidFill>
-                <a:schemeClr val="tx1"/>
-              </a:solidFill>
-            </a:endParaRPr>
-          </a:p>
-          <a:p>
-            <a:r>
-              <a:rPr lang="en-US" sz="1050" dirty="0" smtClean="0">
-                <a:solidFill>
-                  <a:schemeClr val="tx1"/>
-                </a:solidFill>
-              </a:rPr>
-              <a:t>In class</a:t>
-            </a:r>
-          </a:p>
-          <a:p>
-            <a:pPr marL="171450" indent="-171450">
-              <a:buFontTx/>
-              <a:buChar char="-"/>
-            </a:pPr>
-            <a:r>
-              <a:rPr lang="en-US" sz="1050" dirty="0" smtClean="0">
-                <a:solidFill>
-                  <a:schemeClr val="tx1"/>
-                </a:solidFill>
-              </a:rPr>
-              <a:t>Send request for request to queue</a:t>
-            </a:r>
-          </a:p>
-          <a:p>
-            <a:pPr marL="171450" indent="-171450">
-              <a:buFontTx/>
-              <a:buChar char="-"/>
-            </a:pPr>
-            <a:r>
-              <a:rPr lang="en-US" sz="1050" dirty="0" smtClean="0">
-                <a:solidFill>
-                  <a:schemeClr val="tx1"/>
-                </a:solidFill>
-              </a:rPr>
-              <a:t>Send updated requests to topic</a:t>
-            </a:r>
-          </a:p>
-          <a:p>
-            <a:pPr marL="628650" lvl="1" indent="-171450">
-              <a:buFontTx/>
-              <a:buChar char="-"/>
-            </a:pPr>
-            <a:r>
-              <a:rPr lang="en-US" sz="1050" dirty="0" smtClean="0">
-                <a:solidFill>
-                  <a:schemeClr val="tx1"/>
-                </a:solidFill>
-              </a:rPr>
-              <a:t>Need more info???</a:t>
-            </a:r>
-          </a:p>
-          <a:p>
-            <a:pPr marL="628650" lvl="1" indent="-171450">
-              <a:buFontTx/>
-              <a:buChar char="-"/>
-            </a:pPr>
-            <a:endParaRPr lang="en-US" sz="1050" dirty="0" smtClean="0">
-              <a:solidFill>
-                <a:schemeClr val="tx1"/>
-              </a:solidFill>
-            </a:endParaRPr>
-          </a:p>
-          <a:p>
-            <a:pPr marL="285750" indent="-285750">
-              <a:buFontTx/>
-              <a:buChar char="-"/>
-            </a:pPr>
-            <a:endParaRPr lang="en-US" dirty="0">
-              <a:solidFill>
-                <a:schemeClr val="tx1"/>
-              </a:solidFill>
-            </a:endParaRPr>
-          </a:p>
-        </p:txBody>
-      </p:sp>
-    </p:spTree>
-    <p:extLst>
-      <p:ext uri="{BB962C8B-B14F-4D97-AF65-F5344CB8AC3E}">
-        <p14:creationId xmlns:p14="http://schemas.microsoft.com/office/powerpoint/2010/main" val="2842918892"/>
-      </p:ext>
-    </p:extLst>
-  </p:cSld>
-  <p:clrMapOvr>
-    <a:masterClrMapping/>
-  </p:clrMapOvr>
-</p:sld>
-</file>
-
-<file path=ppt/slides/slide8.xml><?xml version="1.0" encoding="utf-8"?>
-<p:sld xmlns:a="http://schemas.openxmlformats.org/drawingml/2006/main" xmlns:r="http://schemas.openxmlformats.org/officeDocument/2006/relationships" xmlns:p="http://schemas.openxmlformats.org/presentationml/2006/main">
-  <p:cSld>
-    <p:spTree>
-      <p:nvGrpSpPr>
-        <p:cNvPr id="1" name=""/>
-        <p:cNvGrpSpPr/>
-        <p:nvPr/>
-      </p:nvGrpSpPr>
-      <p:grpSpPr>
-        <a:xfrm>
-          <a:off x="0" y="0"/>
-          <a:ext cx="0" cy="0"/>
-          <a:chOff x="0" y="0"/>
-          <a:chExt cx="0" cy="0"/>
-        </a:xfrm>
-      </p:grpSpPr>
-      <p:sp>
-        <p:nvSpPr>
-          <p:cNvPr id="2" name="Title 1"/>
-          <p:cNvSpPr>
-            <a:spLocks noGrp="1"/>
-          </p:cNvSpPr>
-          <p:nvPr>
-            <p:ph type="title"/>
-          </p:nvPr>
-        </p:nvSpPr>
-        <p:spPr/>
-        <p:txBody>
-          <a:bodyPr/>
-          <a:lstStyle/>
-          <a:p>
-            <a:r>
-              <a:rPr lang="en-US" dirty="0"/>
-              <a:t>User Story </a:t>
-            </a:r>
-            <a:r>
-              <a:rPr lang="en-US" dirty="0" smtClean="0"/>
-              <a:t>4-1: Design Details</a:t>
-            </a:r>
-            <a:endParaRPr lang="en-US" dirty="0"/>
-          </a:p>
-        </p:txBody>
-      </p:sp>
-      <p:sp>
-        <p:nvSpPr>
-          <p:cNvPr id="3" name="Content Placeholder 2"/>
-          <p:cNvSpPr>
-            <a:spLocks noGrp="1"/>
-          </p:cNvSpPr>
-          <p:nvPr>
-            <p:ph idx="1"/>
-          </p:nvPr>
-        </p:nvSpPr>
-        <p:spPr/>
-        <p:txBody>
-          <a:bodyPr>
-            <a:normAutofit/>
-          </a:bodyPr>
-          <a:lstStyle/>
-          <a:p>
-            <a:r>
-              <a:rPr lang="en-US" dirty="0" smtClean="0"/>
-              <a:t>Just as we’re doing with service-to-service communications, we’re going to use </a:t>
-            </a:r>
-            <a:r>
-              <a:rPr lang="en-US" dirty="0" err="1" smtClean="0"/>
-              <a:t>async</a:t>
-            </a:r>
-            <a:r>
-              <a:rPr lang="en-US" dirty="0" smtClean="0"/>
-              <a:t> messaging to make a request from the UI to retrieve a request for the user.</a:t>
-            </a:r>
-          </a:p>
-          <a:p>
-            <a:pPr lvl="1"/>
-            <a:r>
-              <a:rPr lang="en-US" dirty="0" smtClean="0"/>
-              <a:t>Send a </a:t>
-            </a:r>
-            <a:r>
-              <a:rPr lang="en-US" i="1" dirty="0" smtClean="0"/>
-              <a:t>command</a:t>
-            </a:r>
-            <a:r>
-              <a:rPr lang="en-US" dirty="0" smtClean="0"/>
-              <a:t> to a new Azure Hub called </a:t>
-            </a:r>
-            <a:r>
-              <a:rPr lang="en-US" i="1" dirty="0" err="1" smtClean="0"/>
-              <a:t>getRequest</a:t>
-            </a:r>
-            <a:r>
-              <a:rPr lang="en-US" dirty="0" smtClean="0"/>
-              <a:t> to get the next request for the current user from the Routing Service. </a:t>
-            </a:r>
-          </a:p>
-          <a:p>
-            <a:pPr lvl="1"/>
-            <a:r>
-              <a:rPr lang="en-US" dirty="0" smtClean="0"/>
-              <a:t>The response will come on another new Hub called </a:t>
-            </a:r>
-            <a:r>
-              <a:rPr lang="en-US" i="1" dirty="0" err="1" smtClean="0"/>
-              <a:t>requestAssigned</a:t>
-            </a:r>
-            <a:r>
-              <a:rPr lang="en-US" dirty="0" smtClean="0"/>
-              <a:t>.</a:t>
-            </a:r>
-          </a:p>
-          <a:p>
-            <a:endParaRPr lang="en-US" dirty="0" smtClean="0"/>
-          </a:p>
-          <a:p>
-            <a:r>
-              <a:rPr lang="en-US" dirty="0" smtClean="0"/>
-              <a:t>When the user makes a decision on a request, we’ll send an event to the </a:t>
-            </a:r>
-            <a:r>
-              <a:rPr lang="en-US" i="1" dirty="0" err="1" smtClean="0"/>
-              <a:t>requestDecided</a:t>
-            </a:r>
-            <a:r>
-              <a:rPr lang="en-US" dirty="0"/>
-              <a:t> </a:t>
-            </a:r>
-            <a:r>
-              <a:rPr lang="en-US" dirty="0" smtClean="0"/>
-              <a:t>we’re already using from the Auto Approval service.</a:t>
-            </a:r>
           </a:p>
         </p:txBody>
       </p:sp>
@@ -4935,7 +3562,7 @@
         </p:blipFill>
         <p:spPr>
           <a:xfrm>
-            <a:off x="9135291" y="274630"/>
+            <a:off x="9135291" y="292047"/>
             <a:ext cx="2455817" cy="1381224"/>
           </a:xfrm>
           <a:prstGeom prst="rect">
@@ -4946,166 +3573,7 @@
     </p:spTree>
     <p:extLst>
       <p:ext uri="{BB962C8B-B14F-4D97-AF65-F5344CB8AC3E}">
-        <p14:creationId xmlns:p14="http://schemas.microsoft.com/office/powerpoint/2010/main" val="3247998469"/>
-      </p:ext>
-    </p:extLst>
-  </p:cSld>
-  <p:clrMapOvr>
-    <a:masterClrMapping/>
-  </p:clrMapOvr>
-</p:sld>
-</file>
-
-<file path=ppt/slides/slide9.xml><?xml version="1.0" encoding="utf-8"?>
-<p:sld xmlns:a="http://schemas.openxmlformats.org/drawingml/2006/main" xmlns:r="http://schemas.openxmlformats.org/officeDocument/2006/relationships" xmlns:p="http://schemas.openxmlformats.org/presentationml/2006/main">
-  <p:cSld>
-    <p:spTree>
-      <p:nvGrpSpPr>
-        <p:cNvPr id="1" name=""/>
-        <p:cNvGrpSpPr/>
-        <p:nvPr/>
-      </p:nvGrpSpPr>
-      <p:grpSpPr>
-        <a:xfrm>
-          <a:off x="0" y="0"/>
-          <a:ext cx="0" cy="0"/>
-          <a:chOff x="0" y="0"/>
-          <a:chExt cx="0" cy="0"/>
-        </a:xfrm>
-      </p:grpSpPr>
-      <p:sp>
-        <p:nvSpPr>
-          <p:cNvPr id="2" name="Title 1"/>
-          <p:cNvSpPr>
-            <a:spLocks noGrp="1"/>
-          </p:cNvSpPr>
-          <p:nvPr>
-            <p:ph type="title"/>
-          </p:nvPr>
-        </p:nvSpPr>
-        <p:spPr/>
-        <p:txBody>
-          <a:bodyPr/>
-          <a:lstStyle/>
-          <a:p>
-            <a:r>
-              <a:rPr lang="en-US" dirty="0"/>
-              <a:t>T</a:t>
-            </a:r>
-            <a:r>
-              <a:rPr lang="en-US" dirty="0" smtClean="0"/>
-              <a:t>ask </a:t>
-            </a:r>
-            <a:r>
-              <a:rPr lang="en-US" dirty="0"/>
-              <a:t>4</a:t>
-            </a:r>
-            <a:r>
-              <a:rPr lang="en-US" dirty="0" smtClean="0"/>
-              <a:t>-1: Create Azure </a:t>
-            </a:r>
-            <a:r>
-              <a:rPr lang="en-US" dirty="0"/>
-              <a:t>E</a:t>
-            </a:r>
-            <a:r>
-              <a:rPr lang="en-US" dirty="0" smtClean="0"/>
-              <a:t>vent </a:t>
-            </a:r>
-            <a:r>
-              <a:rPr lang="en-US" dirty="0"/>
-              <a:t>H</a:t>
-            </a:r>
-            <a:r>
-              <a:rPr lang="en-US" dirty="0" smtClean="0"/>
-              <a:t>ub</a:t>
-            </a:r>
-            <a:endParaRPr lang="en-US" dirty="0"/>
-          </a:p>
-        </p:txBody>
-      </p:sp>
-      <p:sp>
-        <p:nvSpPr>
-          <p:cNvPr id="3" name="Content Placeholder 2"/>
-          <p:cNvSpPr>
-            <a:spLocks noGrp="1"/>
-          </p:cNvSpPr>
-          <p:nvPr>
-            <p:ph idx="1"/>
-          </p:nvPr>
-        </p:nvSpPr>
-        <p:spPr/>
-        <p:txBody>
-          <a:bodyPr/>
-          <a:lstStyle/>
-          <a:p>
-            <a:r>
-              <a:rPr lang="en-US" i="1" dirty="0" smtClean="0"/>
-              <a:t>Similar to Task 1-1</a:t>
-            </a:r>
-          </a:p>
-          <a:p>
-            <a:endParaRPr lang="en-US" dirty="0" smtClean="0"/>
-          </a:p>
-          <a:p>
-            <a:r>
-              <a:rPr lang="en-US" dirty="0" smtClean="0"/>
-              <a:t>Create </a:t>
-            </a:r>
-            <a:r>
-              <a:rPr lang="en-US" i="1" dirty="0" err="1" smtClean="0"/>
-              <a:t>getRequest</a:t>
-            </a:r>
-            <a:r>
-              <a:rPr lang="en-US" dirty="0" smtClean="0"/>
-              <a:t> Azure hub</a:t>
-            </a:r>
-          </a:p>
-          <a:p>
-            <a:endParaRPr lang="en-US" dirty="0" smtClean="0"/>
-          </a:p>
-          <a:p>
-            <a:r>
-              <a:rPr lang="en-US" dirty="0" smtClean="0"/>
-              <a:t>Create Shared Access Policy for publisher</a:t>
-            </a:r>
-          </a:p>
-        </p:txBody>
-      </p:sp>
-      <p:pic>
-        <p:nvPicPr>
-          <p:cNvPr id="4" name="Picture 3"/>
-          <p:cNvPicPr>
-            <a:picLocks noChangeAspect="1"/>
-          </p:cNvPicPr>
-          <p:nvPr/>
-        </p:nvPicPr>
-        <p:blipFill>
-          <a:blip r:embed="rId2" cstate="print">
-            <a:extLst>
-              <a:ext uri="{28A0092B-C50C-407E-A947-70E740481C1C}">
-                <a14:useLocalDpi xmlns:a14="http://schemas.microsoft.com/office/drawing/2010/main" val="0"/>
-              </a:ext>
-            </a:extLst>
-          </a:blip>
-          <a:stretch>
-            <a:fillRect/>
-          </a:stretch>
-        </p:blipFill>
-        <p:spPr>
-          <a:xfrm>
-            <a:off x="9135291" y="274630"/>
-            <a:ext cx="2455817" cy="1381224"/>
-          </a:xfrm>
-          <a:prstGeom prst="rect">
-            <a:avLst/>
-          </a:prstGeom>
-        </p:spPr>
-      </p:pic>
-    </p:spTree>
-    <p:extLst>
-      <p:ext uri="{BB962C8B-B14F-4D97-AF65-F5344CB8AC3E}">
-        <p14:creationId xmlns:p14="http://schemas.microsoft.com/office/powerpoint/2010/main" val="2266380328"/>
+        <p14:creationId xmlns:p14="http://schemas.microsoft.com/office/powerpoint/2010/main" val="2753280656"/>
       </p:ext>
     </p:extLst>
   </p:cSld>

</xml_diff>